<commit_message>
#68, bottom text is now an image
</commit_message>
<xml_diff>
--- a/public/js/tasks/cooperation_task/media/Cooperation_Task_Instructions.12.5.2022.pptx
+++ b/public/js/tasks/cooperation_task/media/Cooperation_Task_Instructions.12.5.2022.pptx
@@ -5,7 +5,7 @@
     <p:sldMasterId id="2147483660" r:id="rId1"/>
   </p:sldMasterIdLst>
   <p:notesMasterIdLst>
-    <p:notesMasterId r:id="rId21"/>
+    <p:notesMasterId r:id="rId23"/>
   </p:notesMasterIdLst>
   <p:sldIdLst>
     <p:sldId id="498" r:id="rId2"/>
@@ -27,6 +27,8 @@
     <p:sldId id="555" r:id="rId18"/>
     <p:sldId id="553" r:id="rId19"/>
     <p:sldId id="554" r:id="rId20"/>
+    <p:sldId id="557" r:id="rId21"/>
+    <p:sldId id="558" r:id="rId22"/>
   </p:sldIdLst>
   <p:sldSz cx="12192000" cy="6858000"/>
   <p:notesSz cx="6858000" cy="9144000"/>
@@ -159,6 +161,12 @@
             <p14:sldId id="554"/>
           </p14:sldIdLst>
         </p14:section>
+        <p14:section name="Misc" id="{D3765E37-7C71-2044-8C6B-7217E011FA0F}">
+          <p14:sldIdLst>
+            <p14:sldId id="557"/>
+            <p14:sldId id="558"/>
+          </p14:sldIdLst>
+        </p14:section>
       </p14:sectionLst>
     </p:ext>
     <p:ext uri="{EFAFB233-063F-42B5-8137-9DF3F51BA10A}">
@@ -261,7 +269,7 @@
           <a:p>
             <a:fld id="{5ACDFB13-8C7E-2148-B293-047F9641DD71}" type="datetimeFigureOut">
               <a:rPr lang="en-US" smtClean="0"/>
-              <a:t>12/5/2022</a:t>
+              <a:t>12/12/22</a:t>
             </a:fld>
             <a:endParaRPr lang="en-US" dirty="0"/>
           </a:p>
@@ -1743,7 +1751,7 @@
           <a:p>
             <a:fld id="{E69A4D3A-6EF8-7448-AC6F-AD52FEDAA6A8}" type="datetimeFigureOut">
               <a:rPr lang="en-US" smtClean="0"/>
-              <a:t>12/5/2022</a:t>
+              <a:t>12/12/22</a:t>
             </a:fld>
             <a:endParaRPr lang="en-US" dirty="0"/>
           </a:p>
@@ -1911,7 +1919,7 @@
           <a:p>
             <a:fld id="{E69A4D3A-6EF8-7448-AC6F-AD52FEDAA6A8}" type="datetimeFigureOut">
               <a:rPr lang="en-US" smtClean="0"/>
-              <a:t>12/5/2022</a:t>
+              <a:t>12/12/22</a:t>
             </a:fld>
             <a:endParaRPr lang="en-US" dirty="0"/>
           </a:p>
@@ -2089,7 +2097,7 @@
           <a:p>
             <a:fld id="{E69A4D3A-6EF8-7448-AC6F-AD52FEDAA6A8}" type="datetimeFigureOut">
               <a:rPr lang="en-US" smtClean="0"/>
-              <a:t>12/5/2022</a:t>
+              <a:t>12/12/22</a:t>
             </a:fld>
             <a:endParaRPr lang="en-US" dirty="0"/>
           </a:p>
@@ -2257,7 +2265,7 @@
           <a:p>
             <a:fld id="{E69A4D3A-6EF8-7448-AC6F-AD52FEDAA6A8}" type="datetimeFigureOut">
               <a:rPr lang="en-US" smtClean="0"/>
-              <a:t>12/5/2022</a:t>
+              <a:t>12/12/22</a:t>
             </a:fld>
             <a:endParaRPr lang="en-US" dirty="0"/>
           </a:p>
@@ -2502,7 +2510,7 @@
           <a:p>
             <a:fld id="{E69A4D3A-6EF8-7448-AC6F-AD52FEDAA6A8}" type="datetimeFigureOut">
               <a:rPr lang="en-US" smtClean="0"/>
-              <a:t>12/5/2022</a:t>
+              <a:t>12/12/22</a:t>
             </a:fld>
             <a:endParaRPr lang="en-US" dirty="0"/>
           </a:p>
@@ -2787,7 +2795,7 @@
           <a:p>
             <a:fld id="{E69A4D3A-6EF8-7448-AC6F-AD52FEDAA6A8}" type="datetimeFigureOut">
               <a:rPr lang="en-US" smtClean="0"/>
-              <a:t>12/5/2022</a:t>
+              <a:t>12/12/22</a:t>
             </a:fld>
             <a:endParaRPr lang="en-US" dirty="0"/>
           </a:p>
@@ -3206,7 +3214,7 @@
           <a:p>
             <a:fld id="{E69A4D3A-6EF8-7448-AC6F-AD52FEDAA6A8}" type="datetimeFigureOut">
               <a:rPr lang="en-US" smtClean="0"/>
-              <a:t>12/5/2022</a:t>
+              <a:t>12/12/22</a:t>
             </a:fld>
             <a:endParaRPr lang="en-US" dirty="0"/>
           </a:p>
@@ -3323,7 +3331,7 @@
           <a:p>
             <a:fld id="{E69A4D3A-6EF8-7448-AC6F-AD52FEDAA6A8}" type="datetimeFigureOut">
               <a:rPr lang="en-US" smtClean="0"/>
-              <a:t>12/5/2022</a:t>
+              <a:t>12/12/22</a:t>
             </a:fld>
             <a:endParaRPr lang="en-US" dirty="0"/>
           </a:p>
@@ -3418,7 +3426,7 @@
           <a:p>
             <a:fld id="{E69A4D3A-6EF8-7448-AC6F-AD52FEDAA6A8}" type="datetimeFigureOut">
               <a:rPr lang="en-US" smtClean="0"/>
-              <a:t>12/5/2022</a:t>
+              <a:t>12/12/22</a:t>
             </a:fld>
             <a:endParaRPr lang="en-US" dirty="0"/>
           </a:p>
@@ -3693,7 +3701,7 @@
           <a:p>
             <a:fld id="{E69A4D3A-6EF8-7448-AC6F-AD52FEDAA6A8}" type="datetimeFigureOut">
               <a:rPr lang="en-US" smtClean="0"/>
-              <a:t>12/5/2022</a:t>
+              <a:t>12/12/22</a:t>
             </a:fld>
             <a:endParaRPr lang="en-US" dirty="0"/>
           </a:p>
@@ -3948,7 +3956,7 @@
           <a:p>
             <a:fld id="{E69A4D3A-6EF8-7448-AC6F-AD52FEDAA6A8}" type="datetimeFigureOut">
               <a:rPr lang="en-US" smtClean="0"/>
-              <a:t>12/5/2022</a:t>
+              <a:t>12/12/22</a:t>
             </a:fld>
             <a:endParaRPr lang="en-US" dirty="0"/>
           </a:p>
@@ -4162,7 +4170,7 @@
           <a:p>
             <a:fld id="{E69A4D3A-6EF8-7448-AC6F-AD52FEDAA6A8}" type="datetimeFigureOut">
               <a:rPr lang="en-US" smtClean="0"/>
-              <a:t>12/5/2022</a:t>
+              <a:t>12/12/22</a:t>
             </a:fld>
             <a:endParaRPr lang="en-US" dirty="0"/>
           </a:p>
@@ -10725,6 +10733,186 @@
     <p:extLst>
       <p:ext uri="{BB962C8B-B14F-4D97-AF65-F5344CB8AC3E}">
         <p14:creationId xmlns:p14="http://schemas.microsoft.com/office/powerpoint/2010/main" val="3104965764"/>
+      </p:ext>
+    </p:extLst>
+  </p:cSld>
+  <p:clrMapOvr>
+    <a:masterClrMapping/>
+  </p:clrMapOvr>
+</p:sld>
+</file>
+
+<file path=ppt/slides/slide20.xml><?xml version="1.0" encoding="utf-8"?>
+<p:sld xmlns:a="http://schemas.openxmlformats.org/drawingml/2006/main" xmlns:r="http://schemas.openxmlformats.org/officeDocument/2006/relationships" xmlns:p="http://schemas.openxmlformats.org/presentationml/2006/main">
+  <p:cSld>
+    <p:spTree>
+      <p:nvGrpSpPr>
+        <p:cNvPr id="1" name=""/>
+        <p:cNvGrpSpPr/>
+        <p:nvPr/>
+      </p:nvGrpSpPr>
+      <p:grpSpPr>
+        <a:xfrm>
+          <a:off x="0" y="0"/>
+          <a:ext cx="0" cy="0"/>
+          <a:chOff x="0" y="0"/>
+          <a:chExt cx="0" cy="0"/>
+        </a:xfrm>
+      </p:grpSpPr>
+      <p:sp>
+        <p:nvSpPr>
+          <p:cNvPr id="2" name="Rectangle 1">
+            <a:extLst>
+              <a:ext uri="{FF2B5EF4-FFF2-40B4-BE49-F238E27FC236}">
+                <a16:creationId xmlns:a16="http://schemas.microsoft.com/office/drawing/2014/main" id="{DC86D54F-8A60-A14B-93F5-3228300142D6}"/>
+              </a:ext>
+            </a:extLst>
+          </p:cNvPr>
+          <p:cNvSpPr/>
+          <p:nvPr/>
+        </p:nvSpPr>
+        <p:spPr>
+          <a:xfrm>
+            <a:off x="1083197" y="4865185"/>
+            <a:ext cx="10025605" cy="1200329"/>
+          </a:xfrm>
+          <a:prstGeom prst="rect">
+            <a:avLst/>
+          </a:prstGeom>
+        </p:spPr>
+        <p:txBody>
+          <a:bodyPr wrap="square">
+            <a:spAutoFit/>
+          </a:bodyPr>
+          <a:lstStyle/>
+          <a:p>
+            <a:pPr algn="ctr"/>
+            <a:r>
+              <a:rPr lang="en-US" sz="3600" dirty="0">
+                <a:latin typeface="+mj-lt"/>
+              </a:rPr>
+              <a:t>You will be shown the </a:t>
+            </a:r>
+            <a:r>
+              <a:rPr lang="en-US" sz="3600" u="sng" dirty="0">
+                <a:latin typeface="+mj-lt"/>
+              </a:rPr>
+              <a:t>neutral</a:t>
+            </a:r>
+            <a:r>
+              <a:rPr lang="en-US" sz="3600" dirty="0">
+                <a:latin typeface="+mj-lt"/>
+              </a:rPr>
+              <a:t> image unless the </a:t>
+            </a:r>
+          </a:p>
+          <a:p>
+            <a:pPr algn="ctr"/>
+            <a:r>
+              <a:rPr lang="en-US" sz="3600" dirty="0">
+                <a:latin typeface="+mj-lt"/>
+              </a:rPr>
+              <a:t>person you choose decides to help you.</a:t>
+            </a:r>
+            <a:endParaRPr lang="en-US" sz="3600" b="0" dirty="0">
+              <a:effectLst/>
+              <a:latin typeface="+mj-lt"/>
+            </a:endParaRPr>
+          </a:p>
+        </p:txBody>
+      </p:sp>
+    </p:spTree>
+    <p:extLst>
+      <p:ext uri="{BB962C8B-B14F-4D97-AF65-F5344CB8AC3E}">
+        <p14:creationId xmlns:p14="http://schemas.microsoft.com/office/powerpoint/2010/main" val="1829442774"/>
+      </p:ext>
+    </p:extLst>
+  </p:cSld>
+  <p:clrMapOvr>
+    <a:masterClrMapping/>
+  </p:clrMapOvr>
+</p:sld>
+</file>
+
+<file path=ppt/slides/slide21.xml><?xml version="1.0" encoding="utf-8"?>
+<p:sld xmlns:a="http://schemas.openxmlformats.org/drawingml/2006/main" xmlns:r="http://schemas.openxmlformats.org/officeDocument/2006/relationships" xmlns:p="http://schemas.openxmlformats.org/presentationml/2006/main">
+  <p:cSld>
+    <p:spTree>
+      <p:nvGrpSpPr>
+        <p:cNvPr id="1" name=""/>
+        <p:cNvGrpSpPr/>
+        <p:nvPr/>
+      </p:nvGrpSpPr>
+      <p:grpSpPr>
+        <a:xfrm>
+          <a:off x="0" y="0"/>
+          <a:ext cx="0" cy="0"/>
+          <a:chOff x="0" y="0"/>
+          <a:chExt cx="0" cy="0"/>
+        </a:xfrm>
+      </p:grpSpPr>
+      <p:sp>
+        <p:nvSpPr>
+          <p:cNvPr id="2" name="Rectangle 1">
+            <a:extLst>
+              <a:ext uri="{FF2B5EF4-FFF2-40B4-BE49-F238E27FC236}">
+                <a16:creationId xmlns:a16="http://schemas.microsoft.com/office/drawing/2014/main" id="{DC86D54F-8A60-A14B-93F5-3228300142D6}"/>
+              </a:ext>
+            </a:extLst>
+          </p:cNvPr>
+          <p:cNvSpPr/>
+          <p:nvPr/>
+        </p:nvSpPr>
+        <p:spPr>
+          <a:xfrm>
+            <a:off x="1083197" y="4865185"/>
+            <a:ext cx="10025605" cy="1200329"/>
+          </a:xfrm>
+          <a:prstGeom prst="rect">
+            <a:avLst/>
+          </a:prstGeom>
+        </p:spPr>
+        <p:txBody>
+          <a:bodyPr wrap="square">
+            <a:spAutoFit/>
+          </a:bodyPr>
+          <a:lstStyle/>
+          <a:p>
+            <a:pPr algn="ctr"/>
+            <a:r>
+              <a:rPr lang="en-US" sz="3600" dirty="0">
+                <a:latin typeface="+mj-lt"/>
+              </a:rPr>
+              <a:t>You will be shown the </a:t>
+            </a:r>
+            <a:r>
+              <a:rPr lang="en-US" sz="3600" u="sng" dirty="0">
+                <a:latin typeface="+mj-lt"/>
+              </a:rPr>
+              <a:t>unpleasant</a:t>
+            </a:r>
+            <a:r>
+              <a:rPr lang="en-US" sz="3600" dirty="0">
+                <a:latin typeface="+mj-lt"/>
+              </a:rPr>
+              <a:t> image unless </a:t>
+            </a:r>
+          </a:p>
+          <a:p>
+            <a:pPr algn="ctr"/>
+            <a:r>
+              <a:rPr lang="en-US" sz="3600" dirty="0">
+                <a:latin typeface="+mj-lt"/>
+              </a:rPr>
+              <a:t>the person you choose decides to help you.</a:t>
+            </a:r>
+          </a:p>
+        </p:txBody>
+      </p:sp>
+    </p:spTree>
+    <p:extLst>
+      <p:ext uri="{BB962C8B-B14F-4D97-AF65-F5344CB8AC3E}">
+        <p14:creationId xmlns:p14="http://schemas.microsoft.com/office/powerpoint/2010/main" val="94290514"/>
       </p:ext>
     </p:extLst>
   </p:cSld>

</xml_diff>